<commit_message>
adding custom msdeploy parameter
</commit_message>
<xml_diff>
--- a/netconf2014-sayedha-deployment.pptx
+++ b/netconf2014-sayedha-deployment.pptx
@@ -3210,8 +3210,8 @@
         </p:blipFill>
         <p:spPr>
           <a:xfrm>
-            <a:off x="7024576" y="2483661"/>
-            <a:ext cx="4877223" cy="1152244"/>
+            <a:off x="608995" y="2445953"/>
+            <a:ext cx="6565126" cy="1551011"/>
           </a:xfrm>
           <a:prstGeom prst="rect">
             <a:avLst/>
@@ -3220,7 +3220,7 @@
       </p:pic>
       <p:pic>
         <p:nvPicPr>
-          <p:cNvPr id="5" name="Picture 4"/>
+          <p:cNvPr id="6" name="Picture 5"/>
           <p:cNvPicPr>
             <a:picLocks noChangeAspect="1"/>
           </p:cNvPicPr>
@@ -3240,38 +3240,8 @@
         </p:blipFill>
         <p:spPr>
           <a:xfrm>
-            <a:off x="1060872" y="4260915"/>
-            <a:ext cx="4878049" cy="1951220"/>
-          </a:xfrm>
-          <a:prstGeom prst="rect">
-            <a:avLst/>
-          </a:prstGeom>
-        </p:spPr>
-      </p:pic>
-      <p:pic>
-        <p:nvPicPr>
-          <p:cNvPr id="6" name="Picture 5"/>
-          <p:cNvPicPr>
-            <a:picLocks noChangeAspect="1"/>
-          </p:cNvPicPr>
-          <p:nvPr/>
-        </p:nvPicPr>
-        <p:blipFill>
-          <a:blip r:embed="rId4">
-            <a:extLst>
-              <a:ext uri="{28A0092B-C50C-407E-A947-70E740481C1C}">
-                <a14:useLocalDpi xmlns:a14="http://schemas.microsoft.com/office/drawing/2010/main" val="0"/>
-              </a:ext>
-            </a:extLst>
-          </a:blip>
-          <a:stretch>
-            <a:fillRect/>
-          </a:stretch>
-        </p:blipFill>
-        <p:spPr>
-          <a:xfrm>
             <a:off x="608995" y="606138"/>
-            <a:ext cx="4877223" cy="597460"/>
+            <a:ext cx="8057075" cy="986992"/>
           </a:xfrm>
           <a:prstGeom prst="rect">
             <a:avLst/>

</xml_diff>